<commit_message>
aggiunta frase nella terza slide
</commit_message>
<xml_diff>
--- a/Fast Quantum Byzantine Agreement.pptx
+++ b/Fast Quantum Byzantine Agreement.pptx
@@ -4740,7 +4740,7 @@
         </p:nvSpPr>
         <p:spPr>
           <a:xfrm>
-            <a:off x="565149" y="1553972"/>
+            <a:off x="723782" y="359653"/>
             <a:ext cx="4114800" cy="4064931"/>
           </a:xfrm>
         </p:spPr>
@@ -4751,12 +4751,16 @@
           <a:lstStyle/>
           <a:p>
             <a:r>
-              <a:rPr lang="it-IT">
-                <a:solidFill>
-                  <a:schemeClr val="bg1"/>
-                </a:solidFill>
-              </a:rPr>
-              <a:t>Fast Quantum Byzantine Agreement</a:t>
+              <a:rPr lang="it-IT" dirty="0"/>
+              <a:t>Fast Quantum </a:t>
+            </a:r>
+            <a:r>
+              <a:rPr lang="it-IT" dirty="0" err="1"/>
+              <a:t>Byzantine</a:t>
+            </a:r>
+            <a:r>
+              <a:rPr lang="it-IT" dirty="0"/>
+              <a:t> Agreement</a:t>
             </a:r>
           </a:p>
         </p:txBody>
@@ -4779,7 +4783,7 @@
         </p:nvSpPr>
         <p:spPr>
           <a:xfrm>
-            <a:off x="6096000" y="1553972"/>
+            <a:off x="6096000" y="1861882"/>
             <a:ext cx="5530839" cy="4327398"/>
           </a:xfrm>
         </p:spPr>
@@ -4825,6 +4829,30 @@
               <a:rPr lang="it-IT" dirty="0"/>
               <a:t> up to n/3</a:t>
             </a:r>
+          </a:p>
+          <a:p>
+            <a:r>
+              <a:rPr lang="it-IT" dirty="0" err="1"/>
+              <a:t>Used</a:t>
+            </a:r>
+            <a:r>
+              <a:rPr lang="it-IT" dirty="0"/>
+              <a:t> to</a:t>
+            </a:r>
+            <a:r>
+              <a:rPr lang="en-US" dirty="0"/>
+              <a:t> improve the security and speed of the agreement</a:t>
+            </a:r>
+            <a:endParaRPr lang="it-IT" dirty="0"/>
+          </a:p>
+          <a:p>
+            <a:endParaRPr lang="it-IT" dirty="0"/>
+          </a:p>
+          <a:p>
+            <a:endParaRPr lang="it-IT" dirty="0"/>
+          </a:p>
+          <a:p>
+            <a:endParaRPr lang="it-IT" dirty="0"/>
           </a:p>
           <a:p>
             <a:endParaRPr lang="it-IT" dirty="0"/>
@@ -4919,7 +4947,7 @@
         </p:nvSpPr>
         <p:spPr>
           <a:xfrm>
-            <a:off x="565149" y="1553972"/>
+            <a:off x="0" y="1396534"/>
             <a:ext cx="4114800" cy="4064931"/>
           </a:xfrm>
         </p:spPr>
@@ -4930,11 +4958,7 @@
           <a:lstStyle/>
           <a:p>
             <a:r>
-              <a:rPr lang="it-IT" dirty="0">
-                <a:solidFill>
-                  <a:schemeClr val="bg1"/>
-                </a:solidFill>
-              </a:rPr>
+              <a:rPr lang="it-IT" dirty="0"/>
               <a:t>QOCC</a:t>
             </a:r>
           </a:p>

</xml_diff>